<commit_message>
add session3 slides and code
</commit_message>
<xml_diff>
--- a/Kotlin/Slides/5-Anonymous Functions and the Function Type.pptx
+++ b/Kotlin/Slides/5-Anonymous Functions and the Function Type.pptx
@@ -328,7 +328,7 @@
           <a:p>
             <a:fld id="{D0AF4A11-F739-4D74-8F30-05177898FDB2}" type="datetimeFigureOut">
               <a:rPr lang="en-US" smtClean="0"/>
-              <a:t>7/21/2023</a:t>
+              <a:t>7/27/2023</a:t>
             </a:fld>
             <a:endParaRPr lang="en-US"/>
           </a:p>
@@ -498,7 +498,7 @@
           <a:p>
             <a:fld id="{D0AF4A11-F739-4D74-8F30-05177898FDB2}" type="datetimeFigureOut">
               <a:rPr lang="en-US" smtClean="0"/>
-              <a:t>7/21/2023</a:t>
+              <a:t>7/27/2023</a:t>
             </a:fld>
             <a:endParaRPr lang="en-US"/>
           </a:p>
@@ -678,7 +678,7 @@
           <a:p>
             <a:fld id="{D0AF4A11-F739-4D74-8F30-05177898FDB2}" type="datetimeFigureOut">
               <a:rPr lang="en-US" smtClean="0"/>
-              <a:t>7/21/2023</a:t>
+              <a:t>7/27/2023</a:t>
             </a:fld>
             <a:endParaRPr lang="en-US"/>
           </a:p>
@@ -848,7 +848,7 @@
           <a:p>
             <a:fld id="{D0AF4A11-F739-4D74-8F30-05177898FDB2}" type="datetimeFigureOut">
               <a:rPr lang="en-US" smtClean="0"/>
-              <a:t>7/21/2023</a:t>
+              <a:t>7/27/2023</a:t>
             </a:fld>
             <a:endParaRPr lang="en-US"/>
           </a:p>
@@ -1116,7 +1116,7 @@
           <a:p>
             <a:fld id="{D0AF4A11-F739-4D74-8F30-05177898FDB2}" type="datetimeFigureOut">
               <a:rPr lang="en-US" smtClean="0"/>
-              <a:t>7/21/2023</a:t>
+              <a:t>7/27/2023</a:t>
             </a:fld>
             <a:endParaRPr lang="en-US"/>
           </a:p>
@@ -1348,7 +1348,7 @@
           <a:p>
             <a:fld id="{D0AF4A11-F739-4D74-8F30-05177898FDB2}" type="datetimeFigureOut">
               <a:rPr lang="en-US" smtClean="0"/>
-              <a:t>7/21/2023</a:t>
+              <a:t>7/27/2023</a:t>
             </a:fld>
             <a:endParaRPr lang="en-US"/>
           </a:p>
@@ -1707,7 +1707,7 @@
           <a:p>
             <a:fld id="{D0AF4A11-F739-4D74-8F30-05177898FDB2}" type="datetimeFigureOut">
               <a:rPr lang="en-US" smtClean="0"/>
-              <a:t>7/21/2023</a:t>
+              <a:t>7/27/2023</a:t>
             </a:fld>
             <a:endParaRPr lang="en-US"/>
           </a:p>
@@ -1848,7 +1848,7 @@
           <a:p>
             <a:fld id="{D0AF4A11-F739-4D74-8F30-05177898FDB2}" type="datetimeFigureOut">
               <a:rPr lang="en-US" smtClean="0"/>
-              <a:t>7/21/2023</a:t>
+              <a:t>7/27/2023</a:t>
             </a:fld>
             <a:endParaRPr lang="en-US"/>
           </a:p>
@@ -1943,7 +1943,7 @@
           <a:p>
             <a:fld id="{D0AF4A11-F739-4D74-8F30-05177898FDB2}" type="datetimeFigureOut">
               <a:rPr lang="en-US" smtClean="0"/>
-              <a:t>7/21/2023</a:t>
+              <a:t>7/27/2023</a:t>
             </a:fld>
             <a:endParaRPr lang="en-US"/>
           </a:p>
@@ -2300,7 +2300,7 @@
           <a:p>
             <a:fld id="{D0AF4A11-F739-4D74-8F30-05177898FDB2}" type="datetimeFigureOut">
               <a:rPr lang="en-US" smtClean="0"/>
-              <a:t>7/21/2023</a:t>
+              <a:t>7/27/2023</a:t>
             </a:fld>
             <a:endParaRPr lang="en-US"/>
           </a:p>
@@ -2657,7 +2657,7 @@
           <a:p>
             <a:fld id="{D0AF4A11-F739-4D74-8F30-05177898FDB2}" type="datetimeFigureOut">
               <a:rPr lang="en-US" smtClean="0"/>
-              <a:t>7/21/2023</a:t>
+              <a:t>7/27/2023</a:t>
             </a:fld>
             <a:endParaRPr lang="en-US"/>
           </a:p>
@@ -2899,7 +2899,7 @@
           <a:p>
             <a:fld id="{D0AF4A11-F739-4D74-8F30-05177898FDB2}" type="datetimeFigureOut">
               <a:rPr lang="en-US" smtClean="0"/>
-              <a:t>7/21/2023</a:t>
+              <a:t>7/27/2023</a:t>
             </a:fld>
             <a:endParaRPr lang="en-US"/>
           </a:p>
@@ -6243,7 +6243,7 @@
               <a:buNone/>
             </a:pPr>
             <a:r>
-              <a:rPr lang="en-US" sz="1800" b="1" i="0" u="none" strike="noStrike" baseline="0" dirty="0" err="1">
+              <a:rPr lang="en-US" sz="1800" b="1" i="0" u="none" strike="sngStrike" baseline="0" dirty="0" err="1">
                 <a:solidFill>
                   <a:schemeClr val="tx2"/>
                 </a:solidFill>
@@ -6252,7 +6252,7 @@
               <a:t>println</a:t>
             </a:r>
             <a:r>
-              <a:rPr lang="en-US" sz="1800" b="1" i="0" u="none" strike="noStrike" baseline="0" dirty="0">
+              <a:rPr lang="en-US" sz="1800" b="1" i="0" u="none" strike="sngStrike" baseline="0" dirty="0">
                 <a:solidFill>
                   <a:schemeClr val="tx2"/>
                 </a:solidFill>
@@ -6261,7 +6261,7 @@
               <a:t>("Adding $</a:t>
             </a:r>
             <a:r>
-              <a:rPr lang="en-US" sz="1800" b="1" i="0" u="none" strike="noStrike" baseline="0" dirty="0" err="1">
+              <a:rPr lang="en-US" sz="1800" b="1" i="0" u="none" strike="sngStrike" baseline="0" dirty="0" err="1">
                 <a:solidFill>
                   <a:schemeClr val="tx2"/>
                 </a:solidFill>
@@ -6270,7 +6270,7 @@
               <a:t>numBuildings</a:t>
             </a:r>
             <a:r>
-              <a:rPr lang="en-US" sz="1800" b="1" i="0" u="none" strike="noStrike" baseline="0" dirty="0">
+              <a:rPr lang="en-US" sz="1800" b="1" i="0" u="none" strike="sngStrike" baseline="0" dirty="0">
                 <a:solidFill>
                   <a:schemeClr val="tx2"/>
                 </a:solidFill>
@@ -6284,7 +6284,7 @@
               <a:buNone/>
             </a:pPr>
             <a:r>
-              <a:rPr lang="en-US" sz="1800" b="1" i="0" u="none" strike="noStrike" baseline="0" dirty="0">
+              <a:rPr lang="en-US" sz="1800" b="1" i="0" u="none" strike="sngStrike" baseline="0" dirty="0">
                 <a:solidFill>
                   <a:schemeClr val="tx2"/>
                 </a:solidFill>
@@ -6293,7 +6293,7 @@
               <a:t>"Welcome to </a:t>
             </a:r>
             <a:r>
-              <a:rPr lang="en-US" sz="1800" b="1" i="0" u="none" strike="noStrike" baseline="0" dirty="0" err="1">
+              <a:rPr lang="en-US" sz="1800" b="1" i="0" u="none" strike="sngStrike" baseline="0" dirty="0" err="1">
                 <a:solidFill>
                   <a:schemeClr val="tx2"/>
                 </a:solidFill>
@@ -6302,7 +6302,7 @@
               <a:t>SimVillage</a:t>
             </a:r>
             <a:r>
-              <a:rPr lang="en-US" sz="1800" b="1" i="0" u="none" strike="noStrike" baseline="0" dirty="0">
+              <a:rPr lang="en-US" sz="1800" b="1" i="0" u="none" strike="sngStrike" baseline="0" dirty="0">
                 <a:solidFill>
                   <a:schemeClr val="tx2"/>
                 </a:solidFill>
@@ -6311,7 +6311,7 @@
               <a:t>, $</a:t>
             </a:r>
             <a:r>
-              <a:rPr lang="en-US" sz="1800" b="1" i="0" u="none" strike="noStrike" baseline="0" dirty="0" err="1">
+              <a:rPr lang="en-US" sz="1800" b="1" i="0" u="none" strike="sngStrike" baseline="0" dirty="0" err="1">
                 <a:solidFill>
                   <a:schemeClr val="tx2"/>
                 </a:solidFill>
@@ -6320,7 +6320,7 @@
               <a:t>playerName</a:t>
             </a:r>
             <a:r>
-              <a:rPr lang="en-US" sz="1800" b="1" i="0" u="none" strike="noStrike" baseline="0" dirty="0">
+              <a:rPr lang="en-US" sz="1800" b="1" i="0" u="none" strike="sngStrike" baseline="0" dirty="0">
                 <a:solidFill>
                   <a:schemeClr val="tx2"/>
                 </a:solidFill>
@@ -6329,7 +6329,7 @@
               <a:t>! (copyright $</a:t>
             </a:r>
             <a:r>
-              <a:rPr lang="en-US" sz="1800" b="1" i="0" u="none" strike="noStrike" baseline="0" dirty="0" err="1">
+              <a:rPr lang="en-US" sz="1800" b="1" i="0" u="none" strike="sngStrike" baseline="0" dirty="0" err="1">
                 <a:solidFill>
                   <a:schemeClr val="tx2"/>
                 </a:solidFill>
@@ -6338,7 +6338,7 @@
               <a:t>currentYear</a:t>
             </a:r>
             <a:r>
-              <a:rPr lang="en-US" sz="1800" b="1" i="0" u="none" strike="noStrike" baseline="0" dirty="0">
+              <a:rPr lang="en-US" sz="1800" b="1" i="0" u="none" strike="sngStrike" baseline="0" dirty="0">
                 <a:solidFill>
                   <a:schemeClr val="tx2"/>
                 </a:solidFill>
@@ -6352,7 +6352,7 @@
               <a:buNone/>
             </a:pPr>
             <a:r>
-              <a:rPr lang="en-US" sz="1800" b="1" i="0" u="none" strike="noStrike" baseline="0" dirty="0">
+              <a:rPr lang="en-US" sz="1800" b="1" i="0" u="none" strike="sngStrike" baseline="0" dirty="0">
                 <a:solidFill>
                   <a:schemeClr val="tx2"/>
                 </a:solidFill>
@@ -10893,47 +10893,20 @@
               <a:buNone/>
             </a:pPr>
             <a:r>
-              <a:rPr lang="en-US" sz="1800" b="1" i="0" u="none" strike="noStrike" baseline="0" dirty="0">
-                <a:solidFill>
-                  <a:schemeClr val="tx2"/>
-                </a:solidFill>
-                <a:latin typeface="CourierNewPS-BoldMT"/>
-              </a:rPr>
-              <a:t>"Welcome to </a:t>
-            </a:r>
-            <a:r>
-              <a:rPr lang="en-US" sz="1800" b="1" i="0" u="none" strike="noStrike" baseline="0" dirty="0" err="1">
-                <a:solidFill>
-                  <a:schemeClr val="tx2"/>
-                </a:solidFill>
-                <a:latin typeface="CourierNewPS-BoldMT"/>
-              </a:rPr>
-              <a:t>SimVillage</a:t>
-            </a:r>
-            <a:r>
-              <a:rPr lang="en-US" sz="1800" b="1" i="0" u="none" strike="noStrike" baseline="0" dirty="0">
-                <a:solidFill>
-                  <a:schemeClr val="tx2"/>
-                </a:solidFill>
-                <a:latin typeface="CourierNewPS-BoldMT"/>
-              </a:rPr>
-              <a:t>, Mayor! (copyright $</a:t>
-            </a:r>
-            <a:r>
-              <a:rPr lang="en-US" sz="1800" b="1" i="0" u="none" strike="noStrike" baseline="0" dirty="0" err="1">
-                <a:solidFill>
-                  <a:schemeClr val="tx2"/>
-                </a:solidFill>
-                <a:latin typeface="CourierNewPS-BoldMT"/>
+              <a:rPr lang="en-US" sz="1800" b="0" i="0" u="none" strike="noStrike" baseline="0" dirty="0">
+                <a:latin typeface="CourierNewPSMT"/>
+              </a:rPr>
+              <a:t>"Welcome to $</a:t>
+            </a:r>
+            <a:r>
+              <a:rPr lang="en-US" sz="1800" b="0" i="0" u="none" strike="noStrike" baseline="0" dirty="0" err="1">
+                <a:latin typeface="CourierNewPSMT"/>
               </a:rPr>
               <a:t>currentYear</a:t>
             </a:r>
             <a:r>
-              <a:rPr lang="en-US" sz="1800" b="1" i="0" u="none" strike="noStrike" baseline="0" dirty="0">
-                <a:solidFill>
-                  <a:schemeClr val="tx2"/>
-                </a:solidFill>
-                <a:latin typeface="CourierNewPS-BoldMT"/>
+              <a:rPr lang="en-US" sz="1800" b="0" i="0" u="none" strike="noStrike" baseline="0" dirty="0">
+                <a:latin typeface="CourierNewPSMT"/>
               </a:rPr>
               <a:t>)"</a:t>
             </a:r>
@@ -11405,47 +11378,20 @@
               <a:buNone/>
             </a:pPr>
             <a:r>
-              <a:rPr lang="en-US" sz="1800" b="1" i="0" u="none" strike="noStrike" baseline="0" dirty="0">
-                <a:solidFill>
-                  <a:schemeClr val="tx2"/>
-                </a:solidFill>
-                <a:latin typeface="CourierNewPS-BoldMT"/>
-              </a:rPr>
-              <a:t>"Welcome to </a:t>
-            </a:r>
-            <a:r>
-              <a:rPr lang="en-US" sz="1800" b="1" i="0" u="none" strike="noStrike" baseline="0" dirty="0" err="1">
-                <a:solidFill>
-                  <a:schemeClr val="tx2"/>
-                </a:solidFill>
-                <a:latin typeface="CourierNewPS-BoldMT"/>
-              </a:rPr>
-              <a:t>SimVillage</a:t>
-            </a:r>
-            <a:r>
-              <a:rPr lang="en-US" sz="1800" b="1" i="0" u="none" strike="noStrike" baseline="0" dirty="0">
-                <a:solidFill>
-                  <a:schemeClr val="tx2"/>
-                </a:solidFill>
-                <a:latin typeface="CourierNewPS-BoldMT"/>
-              </a:rPr>
-              <a:t>, Mayor! (copyright $</a:t>
-            </a:r>
-            <a:r>
-              <a:rPr lang="en-US" sz="1800" b="1" i="0" u="none" strike="noStrike" baseline="0" dirty="0" err="1">
-                <a:solidFill>
-                  <a:schemeClr val="tx2"/>
-                </a:solidFill>
-                <a:latin typeface="CourierNewPS-BoldMT"/>
+              <a:rPr lang="en-US" sz="1800" b="0" i="0" u="none" strike="noStrike" baseline="0" dirty="0">
+                <a:latin typeface="CourierNewPSMT"/>
+              </a:rPr>
+              <a:t>"Welcome to $</a:t>
+            </a:r>
+            <a:r>
+              <a:rPr lang="en-US" sz="1800" b="0" i="0" u="none" strike="noStrike" baseline="0" dirty="0" err="1">
+                <a:latin typeface="CourierNewPSMT"/>
               </a:rPr>
               <a:t>currentYear</a:t>
             </a:r>
             <a:r>
-              <a:rPr lang="en-US" sz="1800" b="1" i="0" u="none" strike="noStrike" baseline="0" dirty="0">
-                <a:solidFill>
-                  <a:schemeClr val="tx2"/>
-                </a:solidFill>
-                <a:latin typeface="CourierNewPS-BoldMT"/>
+              <a:rPr lang="en-US" sz="1800" b="0" i="0" u="none" strike="noStrike" baseline="0" dirty="0">
+                <a:latin typeface="CourierNewPSMT"/>
               </a:rPr>
               <a:t>)"</a:t>
             </a:r>
@@ -11837,19 +11783,7 @@
               <a:rPr lang="en-US" sz="1800" b="0" i="0" u="none" strike="noStrike" baseline="0" dirty="0">
                 <a:latin typeface="CourierNewPSMT"/>
               </a:rPr>
-              <a:t>"Welcome to </a:t>
-            </a:r>
-            <a:r>
-              <a:rPr lang="en-US" sz="1800" b="0" i="0" u="none" strike="noStrike" baseline="0" dirty="0" err="1">
-                <a:latin typeface="CourierNewPSMT"/>
-              </a:rPr>
-              <a:t>SimVillage</a:t>
-            </a:r>
-            <a:r>
-              <a:rPr lang="en-US" sz="1800" b="0" i="0" u="none" strike="noStrike" baseline="0" dirty="0">
-                <a:latin typeface="CourierNewPSMT"/>
-              </a:rPr>
-              <a:t>, Mayor! (copyright $</a:t>
+              <a:t>"Welcome to $</a:t>
             </a:r>
             <a:r>
               <a:rPr lang="en-US" sz="1800" b="0" i="0" u="none" strike="noStrike" baseline="0" dirty="0" err="1">

</xml_diff>